<commit_message>
All code to pep8
</commit_message>
<xml_diff>
--- a/Презентация три.ч.pptx
+++ b/Презентация три.ч.pptx
@@ -13,6 +13,7 @@
     <p:sldId id="261" r:id="rId7"/>
     <p:sldId id="262" r:id="rId8"/>
     <p:sldId id="263" r:id="rId9"/>
+    <p:sldId id="264" r:id="rId10"/>
   </p:sldIdLst>
   <p:sldSz cx="12192000" cy="6858000"/>
   <p:notesSz cx="6858000" cy="9144000"/>
@@ -111,6 +112,11 @@
       </a:defRPr>
     </a:lvl9pPr>
   </p:defaultTextStyle>
+  <p:extLst>
+    <p:ext uri="{EFAFB233-063F-42B5-8137-9DF3F51BA10A}">
+      <p15:sldGuideLst xmlns:p15="http://schemas.microsoft.com/office/powerpoint/2012/main"/>
+    </p:ext>
+  </p:extLst>
 </p:presentation>
 </file>
 
@@ -340,7 +346,7 @@
           <a:p>
             <a:fld id="{4C4968F5-F9E2-499A-9FBD-24FAAC7FDB4E}" type="datetimeFigureOut">
               <a:rPr lang="ru-RU" smtClean="0"/>
-              <a:t>16.03.2019</a:t>
+              <a:t>18.03.2019</a:t>
             </a:fld>
             <a:endParaRPr lang="ru-RU" dirty="0"/>
           </a:p>
@@ -548,7 +554,7 @@
           <a:p>
             <a:fld id="{4C4968F5-F9E2-499A-9FBD-24FAAC7FDB4E}" type="datetimeFigureOut">
               <a:rPr lang="ru-RU" smtClean="0"/>
-              <a:t>16.03.2019</a:t>
+              <a:t>18.03.2019</a:t>
             </a:fld>
             <a:endParaRPr lang="ru-RU" dirty="0"/>
           </a:p>
@@ -804,7 +810,7 @@
           <a:p>
             <a:fld id="{4C4968F5-F9E2-499A-9FBD-24FAAC7FDB4E}" type="datetimeFigureOut">
               <a:rPr lang="ru-RU" smtClean="0"/>
-              <a:t>16.03.2019</a:t>
+              <a:t>18.03.2019</a:t>
             </a:fld>
             <a:endParaRPr lang="ru-RU" dirty="0"/>
           </a:p>
@@ -978,7 +984,7 @@
           <a:p>
             <a:fld id="{4C4968F5-F9E2-499A-9FBD-24FAAC7FDB4E}" type="datetimeFigureOut">
               <a:rPr lang="ru-RU" smtClean="0"/>
-              <a:t>16.03.2019</a:t>
+              <a:t>18.03.2019</a:t>
             </a:fld>
             <a:endParaRPr lang="ru-RU" dirty="0"/>
           </a:p>
@@ -1321,7 +1327,7 @@
           <a:p>
             <a:fld id="{4C4968F5-F9E2-499A-9FBD-24FAAC7FDB4E}" type="datetimeFigureOut">
               <a:rPr lang="ru-RU" smtClean="0"/>
-              <a:t>16.03.2019</a:t>
+              <a:t>18.03.2019</a:t>
             </a:fld>
             <a:endParaRPr lang="ru-RU" dirty="0"/>
           </a:p>
@@ -1596,7 +1602,7 @@
           <a:p>
             <a:fld id="{4C4968F5-F9E2-499A-9FBD-24FAAC7FDB4E}" type="datetimeFigureOut">
               <a:rPr lang="ru-RU" smtClean="0"/>
-              <a:t>16.03.2019</a:t>
+              <a:t>18.03.2019</a:t>
             </a:fld>
             <a:endParaRPr lang="ru-RU" dirty="0"/>
           </a:p>
@@ -1975,7 +1981,7 @@
           <a:p>
             <a:fld id="{4C4968F5-F9E2-499A-9FBD-24FAAC7FDB4E}" type="datetimeFigureOut">
               <a:rPr lang="ru-RU" smtClean="0"/>
-              <a:t>16.03.2019</a:t>
+              <a:t>18.03.2019</a:t>
             </a:fld>
             <a:endParaRPr lang="ru-RU" dirty="0"/>
           </a:p>
@@ -2093,7 +2099,7 @@
           <a:p>
             <a:fld id="{4C4968F5-F9E2-499A-9FBD-24FAAC7FDB4E}" type="datetimeFigureOut">
               <a:rPr lang="ru-RU" smtClean="0"/>
-              <a:t>16.03.2019</a:t>
+              <a:t>18.03.2019</a:t>
             </a:fld>
             <a:endParaRPr lang="ru-RU" dirty="0"/>
           </a:p>
@@ -2264,7 +2270,7 @@
           <a:p>
             <a:fld id="{4C4968F5-F9E2-499A-9FBD-24FAAC7FDB4E}" type="datetimeFigureOut">
               <a:rPr lang="ru-RU" smtClean="0"/>
-              <a:t>16.03.2019</a:t>
+              <a:t>18.03.2019</a:t>
             </a:fld>
             <a:endParaRPr lang="ru-RU" dirty="0"/>
           </a:p>
@@ -2618,7 +2624,7 @@
           <a:p>
             <a:fld id="{4C4968F5-F9E2-499A-9FBD-24FAAC7FDB4E}" type="datetimeFigureOut">
               <a:rPr lang="ru-RU" smtClean="0"/>
-              <a:t>16.03.2019</a:t>
+              <a:t>18.03.2019</a:t>
             </a:fld>
             <a:endParaRPr lang="ru-RU" dirty="0"/>
           </a:p>
@@ -3000,7 +3006,7 @@
           <a:p>
             <a:fld id="{4C4968F5-F9E2-499A-9FBD-24FAAC7FDB4E}" type="datetimeFigureOut">
               <a:rPr lang="ru-RU" smtClean="0"/>
-              <a:t>16.03.2019</a:t>
+              <a:t>18.03.2019</a:t>
             </a:fld>
             <a:endParaRPr lang="ru-RU" dirty="0"/>
           </a:p>
@@ -3287,7 +3293,7 @@
           <a:p>
             <a:fld id="{4C4968F5-F9E2-499A-9FBD-24FAAC7FDB4E}" type="datetimeFigureOut">
               <a:rPr lang="ru-RU" smtClean="0"/>
-              <a:t>16.03.2019</a:t>
+              <a:t>18.03.2019</a:t>
             </a:fld>
             <a:endParaRPr lang="ru-RU" dirty="0"/>
           </a:p>
@@ -4671,6 +4677,109 @@
 </p:sld>
 </file>
 
+<file path=ppt/slides/slide9.xml><?xml version="1.0" encoding="utf-8"?>
+<p:sld xmlns:a="http://schemas.openxmlformats.org/drawingml/2006/main" xmlns:r="http://schemas.openxmlformats.org/officeDocument/2006/relationships" xmlns:p="http://schemas.openxmlformats.org/presentationml/2006/main">
+  <p:cSld>
+    <p:spTree>
+      <p:nvGrpSpPr>
+        <p:cNvPr id="1" name=""/>
+        <p:cNvGrpSpPr/>
+        <p:nvPr/>
+      </p:nvGrpSpPr>
+      <p:grpSpPr>
+        <a:xfrm>
+          <a:off x="0" y="0"/>
+          <a:ext cx="0" cy="0"/>
+          <a:chOff x="0" y="0"/>
+          <a:chExt cx="0" cy="0"/>
+        </a:xfrm>
+      </p:grpSpPr>
+      <p:sp>
+        <p:nvSpPr>
+          <p:cNvPr id="2" name="Заголовок 1"/>
+          <p:cNvSpPr>
+            <a:spLocks noGrp="1"/>
+          </p:cNvSpPr>
+          <p:nvPr>
+            <p:ph type="title"/>
+          </p:nvPr>
+        </p:nvSpPr>
+        <p:spPr/>
+        <p:txBody>
+          <a:bodyPr/>
+          <a:lstStyle/>
+          <a:p>
+            <a:r>
+              <a:rPr lang="ru-RU" dirty="0" smtClean="0"/>
+              <a:t>Заключение</a:t>
+            </a:r>
+            <a:endParaRPr lang="ru-RU" dirty="0"/>
+          </a:p>
+        </p:txBody>
+      </p:sp>
+      <p:sp>
+        <p:nvSpPr>
+          <p:cNvPr id="3" name="Объект 2"/>
+          <p:cNvSpPr>
+            <a:spLocks noGrp="1"/>
+          </p:cNvSpPr>
+          <p:nvPr>
+            <p:ph idx="1"/>
+          </p:nvPr>
+        </p:nvSpPr>
+        <p:spPr/>
+        <p:txBody>
+          <a:bodyPr/>
+          <a:lstStyle/>
+          <a:p>
+            <a:pPr marL="201168" lvl="1" indent="0">
+              <a:buNone/>
+            </a:pPr>
+            <a:r>
+              <a:rPr lang="ru-RU" dirty="0" smtClean="0"/>
+              <a:t>	</a:t>
+            </a:r>
+            <a:r>
+              <a:rPr lang="ru-RU" sz="2400" dirty="0" smtClean="0"/>
+              <a:t>В заключение хочу сказать, что я выполнил свою цель и создал работоспособный </a:t>
+            </a:r>
+            <a:r>
+              <a:rPr lang="ru-RU" sz="2400" dirty="0" err="1" smtClean="0"/>
+              <a:t>имиджборд</a:t>
+            </a:r>
+            <a:r>
+              <a:rPr lang="ru-RU" sz="2400" dirty="0" smtClean="0"/>
+              <a:t>. Улучшить его можно, добавив на главный экран карусель с картинками из </a:t>
+            </a:r>
+            <a:r>
+              <a:rPr lang="ru-RU" sz="2400" dirty="0" err="1" smtClean="0"/>
+              <a:t>тредов</a:t>
+            </a:r>
+            <a:r>
+              <a:rPr lang="ru-RU" sz="2400" dirty="0" smtClean="0"/>
+              <a:t>, а также профилем пользователя и возможность </a:t>
+            </a:r>
+            <a:r>
+              <a:rPr lang="ru-RU" sz="2400" smtClean="0"/>
+              <a:t>оценивать посты. </a:t>
+            </a:r>
+            <a:endParaRPr lang="ru-RU" dirty="0"/>
+          </a:p>
+        </p:txBody>
+      </p:sp>
+    </p:spTree>
+    <p:extLst>
+      <p:ext uri="{BB962C8B-B14F-4D97-AF65-F5344CB8AC3E}">
+        <p14:creationId xmlns:p14="http://schemas.microsoft.com/office/powerpoint/2010/main" val="390125411"/>
+      </p:ext>
+    </p:extLst>
+  </p:cSld>
+  <p:clrMapOvr>
+    <a:masterClrMapping/>
+  </p:clrMapOvr>
+</p:sld>
+</file>
+
 <file path=ppt/theme/theme1.xml><?xml version="1.0" encoding="utf-8"?>
 <a:theme xmlns:a="http://schemas.openxmlformats.org/drawingml/2006/main" name="Ретро">
   <a:themeElements>

</xml_diff>